<commit_message>
little changes in final ptt 2
</commit_message>
<xml_diff>
--- a/Final presentation 2.pptx
+++ b/Final presentation 2.pptx
@@ -5,7 +5,7 @@
     <p:sldMasterId id="2147483648" r:id="rId1"/>
   </p:sldMasterIdLst>
   <p:notesMasterIdLst>
-    <p:notesMasterId r:id="rId46"/>
+    <p:notesMasterId r:id="rId48"/>
   </p:notesMasterIdLst>
   <p:sldIdLst>
     <p:sldId id="256" r:id="rId2"/>
@@ -41,17 +41,19 @@
     <p:sldId id="286" r:id="rId32"/>
     <p:sldId id="287" r:id="rId33"/>
     <p:sldId id="288" r:id="rId34"/>
-    <p:sldId id="289" r:id="rId35"/>
-    <p:sldId id="290" r:id="rId36"/>
-    <p:sldId id="291" r:id="rId37"/>
-    <p:sldId id="292" r:id="rId38"/>
-    <p:sldId id="293" r:id="rId39"/>
-    <p:sldId id="295" r:id="rId40"/>
-    <p:sldId id="296" r:id="rId41"/>
-    <p:sldId id="297" r:id="rId42"/>
-    <p:sldId id="298" r:id="rId43"/>
-    <p:sldId id="299" r:id="rId44"/>
-    <p:sldId id="300" r:id="rId45"/>
+    <p:sldId id="301" r:id="rId35"/>
+    <p:sldId id="289" r:id="rId36"/>
+    <p:sldId id="290" r:id="rId37"/>
+    <p:sldId id="302" r:id="rId38"/>
+    <p:sldId id="291" r:id="rId39"/>
+    <p:sldId id="292" r:id="rId40"/>
+    <p:sldId id="293" r:id="rId41"/>
+    <p:sldId id="295" r:id="rId42"/>
+    <p:sldId id="296" r:id="rId43"/>
+    <p:sldId id="297" r:id="rId44"/>
+    <p:sldId id="298" r:id="rId45"/>
+    <p:sldId id="299" r:id="rId46"/>
+    <p:sldId id="300" r:id="rId47"/>
   </p:sldIdLst>
   <p:sldSz cx="12192000" cy="6858000"/>
   <p:notesSz cx="6858000" cy="9144000"/>
@@ -240,7 +242,7 @@
           <a:p>
             <a:fld id="{B2E107C9-5FE0-4864-97C4-A8FF847E0675}" type="datetimeFigureOut">
               <a:rPr lang="en-US" smtClean="0"/>
-              <a:t>12/30/2020</a:t>
+              <a:t>12/31/2020</a:t>
             </a:fld>
             <a:endParaRPr lang="en-US"/>
           </a:p>
@@ -928,7 +930,7 @@
           <a:p>
             <a:fld id="{509FA207-E8FD-4363-95A6-907EB6A63BD8}" type="slidenum">
               <a:rPr lang="en-US" smtClean="0"/>
-              <a:t>36</a:t>
+              <a:t>38</a:t>
             </a:fld>
             <a:endParaRPr lang="en-US"/>
           </a:p>
@@ -1153,7 +1155,7 @@
           <a:p>
             <a:fld id="{509FA207-E8FD-4363-95A6-907EB6A63BD8}" type="slidenum">
               <a:rPr lang="en-US" smtClean="0"/>
-              <a:t>43</a:t>
+              <a:t>45</a:t>
             </a:fld>
             <a:endParaRPr lang="en-US"/>
           </a:p>
@@ -2968,7 +2970,7 @@
           <a:p>
             <a:fld id="{CD2AB640-041E-414A-8FDF-E33E6A90A0DD}" type="datetimeFigureOut">
               <a:rPr lang="en-US" smtClean="0"/>
-              <a:t>12/30/2020</a:t>
+              <a:t>12/31/2020</a:t>
             </a:fld>
             <a:endParaRPr lang="en-US"/>
           </a:p>
@@ -3166,7 +3168,7 @@
           <a:p>
             <a:fld id="{CD2AB640-041E-414A-8FDF-E33E6A90A0DD}" type="datetimeFigureOut">
               <a:rPr lang="en-US" smtClean="0"/>
-              <a:t>12/30/2020</a:t>
+              <a:t>12/31/2020</a:t>
             </a:fld>
             <a:endParaRPr lang="en-US"/>
           </a:p>
@@ -3374,7 +3376,7 @@
           <a:p>
             <a:fld id="{CD2AB640-041E-414A-8FDF-E33E6A90A0DD}" type="datetimeFigureOut">
               <a:rPr lang="en-US" smtClean="0"/>
-              <a:t>12/30/2020</a:t>
+              <a:t>12/31/2020</a:t>
             </a:fld>
             <a:endParaRPr lang="en-US"/>
           </a:p>
@@ -3572,7 +3574,7 @@
           <a:p>
             <a:fld id="{CD2AB640-041E-414A-8FDF-E33E6A90A0DD}" type="datetimeFigureOut">
               <a:rPr lang="en-US" smtClean="0"/>
-              <a:t>12/30/2020</a:t>
+              <a:t>12/31/2020</a:t>
             </a:fld>
             <a:endParaRPr lang="en-US"/>
           </a:p>
@@ -3847,7 +3849,7 @@
           <a:p>
             <a:fld id="{CD2AB640-041E-414A-8FDF-E33E6A90A0DD}" type="datetimeFigureOut">
               <a:rPr lang="en-US" smtClean="0"/>
-              <a:t>12/30/2020</a:t>
+              <a:t>12/31/2020</a:t>
             </a:fld>
             <a:endParaRPr lang="en-US"/>
           </a:p>
@@ -4112,7 +4114,7 @@
           <a:p>
             <a:fld id="{CD2AB640-041E-414A-8FDF-E33E6A90A0DD}" type="datetimeFigureOut">
               <a:rPr lang="en-US" smtClean="0"/>
-              <a:t>12/30/2020</a:t>
+              <a:t>12/31/2020</a:t>
             </a:fld>
             <a:endParaRPr lang="en-US"/>
           </a:p>
@@ -4524,7 +4526,7 @@
           <a:p>
             <a:fld id="{CD2AB640-041E-414A-8FDF-E33E6A90A0DD}" type="datetimeFigureOut">
               <a:rPr lang="en-US" smtClean="0"/>
-              <a:t>12/30/2020</a:t>
+              <a:t>12/31/2020</a:t>
             </a:fld>
             <a:endParaRPr lang="en-US"/>
           </a:p>
@@ -4665,7 +4667,7 @@
           <a:p>
             <a:fld id="{CD2AB640-041E-414A-8FDF-E33E6A90A0DD}" type="datetimeFigureOut">
               <a:rPr lang="en-US" smtClean="0"/>
-              <a:t>12/30/2020</a:t>
+              <a:t>12/31/2020</a:t>
             </a:fld>
             <a:endParaRPr lang="en-US"/>
           </a:p>
@@ -4778,7 +4780,7 @@
           <a:p>
             <a:fld id="{CD2AB640-041E-414A-8FDF-E33E6A90A0DD}" type="datetimeFigureOut">
               <a:rPr lang="en-US" smtClean="0"/>
-              <a:t>12/30/2020</a:t>
+              <a:t>12/31/2020</a:t>
             </a:fld>
             <a:endParaRPr lang="en-US"/>
           </a:p>
@@ -5089,7 +5091,7 @@
           <a:p>
             <a:fld id="{CD2AB640-041E-414A-8FDF-E33E6A90A0DD}" type="datetimeFigureOut">
               <a:rPr lang="en-US" smtClean="0"/>
-              <a:t>12/30/2020</a:t>
+              <a:t>12/31/2020</a:t>
             </a:fld>
             <a:endParaRPr lang="en-US"/>
           </a:p>
@@ -5377,7 +5379,7 @@
           <a:p>
             <a:fld id="{CD2AB640-041E-414A-8FDF-E33E6A90A0DD}" type="datetimeFigureOut">
               <a:rPr lang="en-US" smtClean="0"/>
-              <a:t>12/30/2020</a:t>
+              <a:t>12/31/2020</a:t>
             </a:fld>
             <a:endParaRPr lang="en-US"/>
           </a:p>
@@ -5618,7 +5620,7 @@
           <a:p>
             <a:fld id="{CD2AB640-041E-414A-8FDF-E33E6A90A0DD}" type="datetimeFigureOut">
               <a:rPr lang="en-US" smtClean="0"/>
-              <a:t>12/30/2020</a:t>
+              <a:t>12/31/2020</a:t>
             </a:fld>
             <a:endParaRPr lang="en-US"/>
           </a:p>
@@ -14796,6 +14798,259 @@
           <p:cNvPr id="2" name="Title 1">
             <a:extLst>
               <a:ext uri="{FF2B5EF4-FFF2-40B4-BE49-F238E27FC236}">
+                <a16:creationId xmlns:a16="http://schemas.microsoft.com/office/drawing/2014/main" id="{2A93536E-694D-4057-9EFD-3317FD7D6034}"/>
+              </a:ext>
+            </a:extLst>
+          </p:cNvPr>
+          <p:cNvSpPr>
+            <a:spLocks noGrp="1"/>
+          </p:cNvSpPr>
+          <p:nvPr>
+            <p:ph type="title"/>
+          </p:nvPr>
+        </p:nvSpPr>
+        <p:spPr/>
+        <p:txBody>
+          <a:bodyPr/>
+          <a:lstStyle/>
+          <a:p>
+            <a:r>
+              <a:rPr lang="en-US" dirty="0"/>
+              <a:t>Coverage</a:t>
+            </a:r>
+          </a:p>
+        </p:txBody>
+      </p:sp>
+      <p:sp>
+        <p:nvSpPr>
+          <p:cNvPr id="3" name="Content Placeholder 2">
+            <a:extLst>
+              <a:ext uri="{FF2B5EF4-FFF2-40B4-BE49-F238E27FC236}">
+                <a16:creationId xmlns:a16="http://schemas.microsoft.com/office/drawing/2014/main" id="{1FD04047-9752-422C-9CE5-65E85F9C9A23}"/>
+              </a:ext>
+            </a:extLst>
+          </p:cNvPr>
+          <p:cNvSpPr>
+            <a:spLocks noGrp="1"/>
+          </p:cNvSpPr>
+          <p:nvPr>
+            <p:ph idx="1"/>
+          </p:nvPr>
+        </p:nvSpPr>
+        <p:spPr/>
+        <p:txBody>
+          <a:bodyPr/>
+          <a:lstStyle/>
+          <a:p>
+            <a:pPr marL="0" marR="0" indent="0">
+              <a:lnSpc>
+                <a:spcPct val="107000"/>
+              </a:lnSpc>
+              <a:spcBef>
+                <a:spcPts val="0"/>
+              </a:spcBef>
+              <a:spcAft>
+                <a:spcPts val="800"/>
+              </a:spcAft>
+              <a:buNone/>
+            </a:pPr>
+            <a:r>
+              <a:rPr lang="en-US" sz="1800" dirty="0">
+                <a:effectLst/>
+                <a:latin typeface="Calibri" panose="020F0502020204030204" pitchFamily="34" charset="0"/>
+                <a:ea typeface="Calibri" panose="020F0502020204030204" pitchFamily="34" charset="0"/>
+                <a:cs typeface="Arial" panose="020B0604020202020204" pitchFamily="34" charset="0"/>
+              </a:rPr>
+              <a:t>In traditional directed verification methodology, the testcase pass/fail results are used to measure the verification status (functional correctness) &amp;, but the test are limited in terms of randomness.</a:t>
+            </a:r>
+          </a:p>
+          <a:p>
+            <a:pPr marL="0" marR="0" indent="0">
+              <a:lnSpc>
+                <a:spcPct val="107000"/>
+              </a:lnSpc>
+              <a:spcBef>
+                <a:spcPts val="0"/>
+              </a:spcBef>
+              <a:spcAft>
+                <a:spcPts val="800"/>
+              </a:spcAft>
+              <a:buNone/>
+            </a:pPr>
+            <a:r>
+              <a:rPr lang="en-US" sz="1800" dirty="0">
+                <a:latin typeface="Calibri" panose="020F0502020204030204" pitchFamily="34" charset="0"/>
+                <a:ea typeface="Calibri" panose="020F0502020204030204" pitchFamily="34" charset="0"/>
+                <a:cs typeface="Arial" panose="020B0604020202020204" pitchFamily="34" charset="0"/>
+              </a:rPr>
+              <a:t>In the constrain random verification method, the engineer should verify that the test fully cover the defined constrains, therefore test coverages are defined.</a:t>
+            </a:r>
+            <a:endParaRPr lang="en-US" sz="1800" dirty="0">
+              <a:effectLst/>
+              <a:latin typeface="Calibri" panose="020F0502020204030204" pitchFamily="34" charset="0"/>
+              <a:ea typeface="Calibri" panose="020F0502020204030204" pitchFamily="34" charset="0"/>
+              <a:cs typeface="Arial" panose="020B0604020202020204" pitchFamily="34" charset="0"/>
+            </a:endParaRPr>
+          </a:p>
+          <a:p>
+            <a:pPr marL="0" marR="0" indent="0">
+              <a:lnSpc>
+                <a:spcPct val="107000"/>
+              </a:lnSpc>
+              <a:spcBef>
+                <a:spcPts val="0"/>
+              </a:spcBef>
+              <a:spcAft>
+                <a:spcPts val="800"/>
+              </a:spcAft>
+              <a:buNone/>
+            </a:pPr>
+            <a:r>
+              <a:rPr lang="en-US" sz="1800" dirty="0">
+                <a:effectLst/>
+                <a:latin typeface="Calibri" panose="020F0502020204030204" pitchFamily="34" charset="0"/>
+                <a:ea typeface="Calibri" panose="020F0502020204030204" pitchFamily="34" charset="0"/>
+                <a:cs typeface="Arial" panose="020B0604020202020204" pitchFamily="34" charset="0"/>
+              </a:rPr>
+              <a:t>The types of verification coverage:</a:t>
+            </a:r>
+          </a:p>
+          <a:p>
+            <a:pPr marL="342900" marR="0" lvl="0" indent="-342900">
+              <a:lnSpc>
+                <a:spcPct val="107000"/>
+              </a:lnSpc>
+              <a:spcBef>
+                <a:spcPts val="0"/>
+              </a:spcBef>
+              <a:spcAft>
+                <a:spcPts val="0"/>
+              </a:spcAft>
+              <a:buFont typeface="Symbol" panose="05050102010706020507" pitchFamily="18" charset="2"/>
+              <a:buChar char=""/>
+            </a:pPr>
+            <a:r>
+              <a:rPr lang="en-US" sz="1800" dirty="0">
+                <a:effectLst/>
+                <a:latin typeface="Calibri" panose="020F0502020204030204" pitchFamily="34" charset="0"/>
+                <a:ea typeface="Calibri" panose="020F0502020204030204" pitchFamily="34" charset="0"/>
+                <a:cs typeface="Arial" panose="020B0604020202020204" pitchFamily="34" charset="0"/>
+              </a:rPr>
+              <a:t>Code Coverage (which lines of code are executed)</a:t>
+            </a:r>
+          </a:p>
+          <a:p>
+            <a:pPr marL="342900" marR="0" lvl="0" indent="-342900">
+              <a:lnSpc>
+                <a:spcPct val="107000"/>
+              </a:lnSpc>
+              <a:spcBef>
+                <a:spcPts val="0"/>
+              </a:spcBef>
+              <a:spcAft>
+                <a:spcPts val="0"/>
+              </a:spcAft>
+              <a:buFont typeface="Symbol" panose="05050102010706020507" pitchFamily="18" charset="2"/>
+              <a:buChar char=""/>
+            </a:pPr>
+            <a:r>
+              <a:rPr lang="en-US" sz="1800" dirty="0">
+                <a:effectLst/>
+                <a:latin typeface="Calibri" panose="020F0502020204030204" pitchFamily="34" charset="0"/>
+                <a:ea typeface="Calibri" panose="020F0502020204030204" pitchFamily="34" charset="0"/>
+                <a:cs typeface="Arial" panose="020B0604020202020204" pitchFamily="34" charset="0"/>
+              </a:rPr>
+              <a:t>Condition Coverage (whether all branches of conditions have been exercised.)</a:t>
+            </a:r>
+          </a:p>
+          <a:p>
+            <a:pPr marL="342900" marR="0" lvl="0" indent="-342900">
+              <a:lnSpc>
+                <a:spcPct val="107000"/>
+              </a:lnSpc>
+              <a:spcBef>
+                <a:spcPts val="0"/>
+              </a:spcBef>
+              <a:spcAft>
+                <a:spcPts val="0"/>
+              </a:spcAft>
+              <a:buFont typeface="Symbol" panose="05050102010706020507" pitchFamily="18" charset="2"/>
+              <a:buChar char=""/>
+            </a:pPr>
+            <a:r>
+              <a:rPr lang="en-US" sz="1800" dirty="0">
+                <a:effectLst/>
+                <a:latin typeface="Calibri" panose="020F0502020204030204" pitchFamily="34" charset="0"/>
+                <a:ea typeface="Calibri" panose="020F0502020204030204" pitchFamily="34" charset="0"/>
+                <a:cs typeface="Arial" panose="020B0604020202020204" pitchFamily="34" charset="0"/>
+              </a:rPr>
+              <a:t>Functional coverage (how much design functionality has been exercised/covered by the testbench or verification environment)</a:t>
+            </a:r>
+          </a:p>
+          <a:p>
+            <a:pPr marL="342900" marR="0" lvl="0" indent="-342900">
+              <a:lnSpc>
+                <a:spcPct val="107000"/>
+              </a:lnSpc>
+              <a:spcBef>
+                <a:spcPts val="0"/>
+              </a:spcBef>
+              <a:spcAft>
+                <a:spcPts val="800"/>
+              </a:spcAft>
+              <a:buFont typeface="Symbol" panose="05050102010706020507" pitchFamily="18" charset="2"/>
+              <a:buChar char=""/>
+            </a:pPr>
+            <a:r>
+              <a:rPr lang="en-US" sz="1800" dirty="0">
+                <a:effectLst/>
+                <a:latin typeface="Calibri" panose="020F0502020204030204" pitchFamily="34" charset="0"/>
+                <a:ea typeface="Calibri" panose="020F0502020204030204" pitchFamily="34" charset="0"/>
+                <a:cs typeface="Arial" panose="020B0604020202020204" pitchFamily="34" charset="0"/>
+              </a:rPr>
+              <a:t>FSM Coverage (which states and possible state transitions are exercised)</a:t>
+            </a:r>
+          </a:p>
+          <a:p>
+            <a:endParaRPr lang="en-US" dirty="0"/>
+          </a:p>
+        </p:txBody>
+      </p:sp>
+    </p:spTree>
+    <p:extLst>
+      <p:ext uri="{BB962C8B-B14F-4D97-AF65-F5344CB8AC3E}">
+        <p14:creationId xmlns:p14="http://schemas.microsoft.com/office/powerpoint/2010/main" val="3282316532"/>
+      </p:ext>
+    </p:extLst>
+  </p:cSld>
+  <p:clrMapOvr>
+    <a:masterClrMapping/>
+  </p:clrMapOvr>
+</p:sld>
+</file>
+
+<file path=ppt/slides/slide35.xml><?xml version="1.0" encoding="utf-8"?>
+<p:sld xmlns:a="http://schemas.openxmlformats.org/drawingml/2006/main" xmlns:r="http://schemas.openxmlformats.org/officeDocument/2006/relationships" xmlns:p="http://schemas.openxmlformats.org/presentationml/2006/main">
+  <p:cSld>
+    <p:spTree>
+      <p:nvGrpSpPr>
+        <p:cNvPr id="1" name=""/>
+        <p:cNvGrpSpPr/>
+        <p:nvPr/>
+      </p:nvGrpSpPr>
+      <p:grpSpPr>
+        <a:xfrm>
+          <a:off x="0" y="0"/>
+          <a:ext cx="0" cy="0"/>
+          <a:chOff x="0" y="0"/>
+          <a:chExt cx="0" cy="0"/>
+        </a:xfrm>
+      </p:grpSpPr>
+      <p:sp>
+        <p:nvSpPr>
+          <p:cNvPr id="2" name="Title 1">
+            <a:extLst>
+              <a:ext uri="{FF2B5EF4-FFF2-40B4-BE49-F238E27FC236}">
                 <a16:creationId xmlns:a16="http://schemas.microsoft.com/office/drawing/2014/main" id="{FB678E6B-54F9-4DD6-9DFD-6AC6F1C83236}"/>
               </a:ext>
             </a:extLst>
@@ -14916,7 +15171,7 @@
 </p:sld>
 </file>
 
-<file path=ppt/slides/slide35.xml><?xml version="1.0" encoding="utf-8"?>
+<file path=ppt/slides/slide36.xml><?xml version="1.0" encoding="utf-8"?>
 <p:sld xmlns:a="http://schemas.openxmlformats.org/drawingml/2006/main" xmlns:r="http://schemas.openxmlformats.org/officeDocument/2006/relationships" xmlns:p="http://schemas.openxmlformats.org/presentationml/2006/main">
   <p:cSld>
     <p:spTree>
@@ -15043,7 +15298,662 @@
 </p:sld>
 </file>
 
-<file path=ppt/slides/slide36.xml><?xml version="1.0" encoding="utf-8"?>
+<file path=ppt/slides/slide37.xml><?xml version="1.0" encoding="utf-8"?>
+<p:sld xmlns:a="http://schemas.openxmlformats.org/drawingml/2006/main" xmlns:r="http://schemas.openxmlformats.org/officeDocument/2006/relationships" xmlns:p="http://schemas.openxmlformats.org/presentationml/2006/main">
+  <p:cSld>
+    <p:spTree>
+      <p:nvGrpSpPr>
+        <p:cNvPr id="1" name=""/>
+        <p:cNvGrpSpPr/>
+        <p:nvPr/>
+      </p:nvGrpSpPr>
+      <p:grpSpPr>
+        <a:xfrm>
+          <a:off x="0" y="0"/>
+          <a:ext cx="0" cy="0"/>
+          <a:chOff x="0" y="0"/>
+          <a:chExt cx="0" cy="0"/>
+        </a:xfrm>
+      </p:grpSpPr>
+      <p:sp>
+        <p:nvSpPr>
+          <p:cNvPr id="2" name="Title 1">
+            <a:extLst>
+              <a:ext uri="{FF2B5EF4-FFF2-40B4-BE49-F238E27FC236}">
+                <a16:creationId xmlns:a16="http://schemas.microsoft.com/office/drawing/2014/main" id="{818A5AD4-B3A1-4416-A986-BE75E5E78EC8}"/>
+              </a:ext>
+            </a:extLst>
+          </p:cNvPr>
+          <p:cNvSpPr>
+            <a:spLocks noGrp="1"/>
+          </p:cNvSpPr>
+          <p:nvPr>
+            <p:ph type="title"/>
+          </p:nvPr>
+        </p:nvSpPr>
+        <p:spPr/>
+        <p:txBody>
+          <a:bodyPr/>
+          <a:lstStyle/>
+          <a:p>
+            <a:r>
+              <a:rPr lang="en-US" dirty="0"/>
+              <a:t>Coverage results – Conditional Coverage</a:t>
+            </a:r>
+          </a:p>
+        </p:txBody>
+      </p:sp>
+      <p:pic>
+        <p:nvPicPr>
+          <p:cNvPr id="4" name="Picture 3">
+            <a:extLst>
+              <a:ext uri="{FF2B5EF4-FFF2-40B4-BE49-F238E27FC236}">
+                <a16:creationId xmlns:a16="http://schemas.microsoft.com/office/drawing/2014/main" id="{D315DA4D-93CD-4AAB-98F7-5B5091A7F160}"/>
+              </a:ext>
+            </a:extLst>
+          </p:cNvPr>
+          <p:cNvPicPr/>
+          <p:nvPr/>
+        </p:nvPicPr>
+        <p:blipFill>
+          <a:blip r:embed="rId2"/>
+          <a:stretch>
+            <a:fillRect/>
+          </a:stretch>
+        </p:blipFill>
+        <p:spPr>
+          <a:xfrm>
+            <a:off x="7353300" y="1586389"/>
+            <a:ext cx="4000500" cy="4829810"/>
+          </a:xfrm>
+          <a:prstGeom prst="rect">
+            <a:avLst/>
+          </a:prstGeom>
+        </p:spPr>
+      </p:pic>
+      <p:sp>
+        <p:nvSpPr>
+          <p:cNvPr id="5" name="Rectangle 1">
+            <a:extLst>
+              <a:ext uri="{FF2B5EF4-FFF2-40B4-BE49-F238E27FC236}">
+                <a16:creationId xmlns:a16="http://schemas.microsoft.com/office/drawing/2014/main" id="{4EA3C35B-F0F2-4DB4-8ADE-488E085314D3}"/>
+              </a:ext>
+            </a:extLst>
+          </p:cNvPr>
+          <p:cNvSpPr>
+            <a:spLocks noGrp="1" noChangeArrowheads="1"/>
+          </p:cNvSpPr>
+          <p:nvPr>
+            <p:ph idx="1"/>
+          </p:nvPr>
+        </p:nvSpPr>
+        <p:spPr bwMode="auto">
+          <a:xfrm>
+            <a:off x="838200" y="2293135"/>
+            <a:ext cx="5085522" cy="3416320"/>
+          </a:xfrm>
+          <a:prstGeom prst="rect">
+            <a:avLst/>
+          </a:prstGeom>
+          <a:noFill/>
+          <a:ln>
+            <a:noFill/>
+          </a:ln>
+          <a:effectLst/>
+          <a:extLst>
+            <a:ext uri="{909E8E84-426E-40DD-AFC4-6F175D3DCCD1}">
+              <a14:hiddenFill xmlns:a14="http://schemas.microsoft.com/office/drawing/2010/main">
+                <a:solidFill>
+                  <a:schemeClr val="accent1"/>
+                </a:solidFill>
+              </a14:hiddenFill>
+            </a:ext>
+            <a:ext uri="{91240B29-F687-4F45-9708-019B960494DF}">
+              <a14:hiddenLine xmlns:a14="http://schemas.microsoft.com/office/drawing/2010/main" w="9525">
+                <a:solidFill>
+                  <a:schemeClr val="tx1"/>
+                </a:solidFill>
+                <a:miter lim="800000"/>
+                <a:headEnd/>
+                <a:tailEnd/>
+              </a14:hiddenLine>
+            </a:ext>
+            <a:ext uri="{AF507438-7753-43E0-B8FC-AC1667EBCBE1}">
+              <a14:hiddenEffects xmlns:a14="http://schemas.microsoft.com/office/drawing/2010/main">
+                <a:effectLst>
+                  <a:outerShdw dist="35921" dir="2700000" algn="ctr" rotWithShape="0">
+                    <a:schemeClr val="bg2"/>
+                  </a:outerShdw>
+                </a:effectLst>
+              </a14:hiddenEffects>
+            </a:ext>
+          </a:extLst>
+        </p:spPr>
+        <p:txBody>
+          <a:bodyPr vert="horz" wrap="square" lIns="91440" tIns="45720" rIns="91440" bIns="45720" numCol="1" anchor="ctr" anchorCtr="0" compatLnSpc="1">
+            <a:prstTxWarp prst="textNoShape">
+              <a:avLst/>
+            </a:prstTxWarp>
+            <a:spAutoFit/>
+          </a:bodyPr>
+          <a:lstStyle>
+            <a:lvl1pPr eaLnBrk="0" fontAlgn="base" hangingPunct="0">
+              <a:spcBef>
+                <a:spcPct val="0"/>
+              </a:spcBef>
+              <a:spcAft>
+                <a:spcPct val="0"/>
+              </a:spcAft>
+              <a:defRPr>
+                <a:solidFill>
+                  <a:schemeClr val="tx1"/>
+                </a:solidFill>
+                <a:latin typeface="Arial" panose="020B0604020202020204" pitchFamily="34" charset="0"/>
+              </a:defRPr>
+            </a:lvl1pPr>
+            <a:lvl2pPr eaLnBrk="0" fontAlgn="base" hangingPunct="0">
+              <a:spcBef>
+                <a:spcPct val="0"/>
+              </a:spcBef>
+              <a:spcAft>
+                <a:spcPct val="0"/>
+              </a:spcAft>
+              <a:defRPr>
+                <a:solidFill>
+                  <a:schemeClr val="tx1"/>
+                </a:solidFill>
+                <a:latin typeface="Arial" panose="020B0604020202020204" pitchFamily="34" charset="0"/>
+              </a:defRPr>
+            </a:lvl2pPr>
+            <a:lvl3pPr eaLnBrk="0" fontAlgn="base" hangingPunct="0">
+              <a:spcBef>
+                <a:spcPct val="0"/>
+              </a:spcBef>
+              <a:spcAft>
+                <a:spcPct val="0"/>
+              </a:spcAft>
+              <a:defRPr>
+                <a:solidFill>
+                  <a:schemeClr val="tx1"/>
+                </a:solidFill>
+                <a:latin typeface="Arial" panose="020B0604020202020204" pitchFamily="34" charset="0"/>
+              </a:defRPr>
+            </a:lvl3pPr>
+            <a:lvl4pPr eaLnBrk="0" fontAlgn="base" hangingPunct="0">
+              <a:spcBef>
+                <a:spcPct val="0"/>
+              </a:spcBef>
+              <a:spcAft>
+                <a:spcPct val="0"/>
+              </a:spcAft>
+              <a:defRPr>
+                <a:solidFill>
+                  <a:schemeClr val="tx1"/>
+                </a:solidFill>
+                <a:latin typeface="Arial" panose="020B0604020202020204" pitchFamily="34" charset="0"/>
+              </a:defRPr>
+            </a:lvl4pPr>
+            <a:lvl5pPr eaLnBrk="0" fontAlgn="base" hangingPunct="0">
+              <a:spcBef>
+                <a:spcPct val="0"/>
+              </a:spcBef>
+              <a:spcAft>
+                <a:spcPct val="0"/>
+              </a:spcAft>
+              <a:defRPr>
+                <a:solidFill>
+                  <a:schemeClr val="tx1"/>
+                </a:solidFill>
+                <a:latin typeface="Arial" panose="020B0604020202020204" pitchFamily="34" charset="0"/>
+              </a:defRPr>
+            </a:lvl5pPr>
+            <a:lvl6pPr eaLnBrk="0" fontAlgn="base" hangingPunct="0">
+              <a:spcBef>
+                <a:spcPct val="0"/>
+              </a:spcBef>
+              <a:spcAft>
+                <a:spcPct val="0"/>
+              </a:spcAft>
+              <a:defRPr>
+                <a:solidFill>
+                  <a:schemeClr val="tx1"/>
+                </a:solidFill>
+                <a:latin typeface="Arial" panose="020B0604020202020204" pitchFamily="34" charset="0"/>
+              </a:defRPr>
+            </a:lvl6pPr>
+            <a:lvl7pPr eaLnBrk="0" fontAlgn="base" hangingPunct="0">
+              <a:spcBef>
+                <a:spcPct val="0"/>
+              </a:spcBef>
+              <a:spcAft>
+                <a:spcPct val="0"/>
+              </a:spcAft>
+              <a:defRPr>
+                <a:solidFill>
+                  <a:schemeClr val="tx1"/>
+                </a:solidFill>
+                <a:latin typeface="Arial" panose="020B0604020202020204" pitchFamily="34" charset="0"/>
+              </a:defRPr>
+            </a:lvl7pPr>
+            <a:lvl8pPr eaLnBrk="0" fontAlgn="base" hangingPunct="0">
+              <a:spcBef>
+                <a:spcPct val="0"/>
+              </a:spcBef>
+              <a:spcAft>
+                <a:spcPct val="0"/>
+              </a:spcAft>
+              <a:defRPr>
+                <a:solidFill>
+                  <a:schemeClr val="tx1"/>
+                </a:solidFill>
+                <a:latin typeface="Arial" panose="020B0604020202020204" pitchFamily="34" charset="0"/>
+              </a:defRPr>
+            </a:lvl8pPr>
+            <a:lvl9pPr eaLnBrk="0" fontAlgn="base" hangingPunct="0">
+              <a:spcBef>
+                <a:spcPct val="0"/>
+              </a:spcBef>
+              <a:spcAft>
+                <a:spcPct val="0"/>
+              </a:spcAft>
+              <a:defRPr>
+                <a:solidFill>
+                  <a:schemeClr val="tx1"/>
+                </a:solidFill>
+                <a:latin typeface="Arial" panose="020B0604020202020204" pitchFamily="34" charset="0"/>
+              </a:defRPr>
+            </a:lvl9pPr>
+          </a:lstStyle>
+          <a:p>
+            <a:pPr marL="0" marR="0" lvl="0" indent="0" algn="l" defTabSz="914400" rtl="0" eaLnBrk="0" fontAlgn="base" latinLnBrk="0" hangingPunct="0">
+              <a:lnSpc>
+                <a:spcPct val="100000"/>
+              </a:lnSpc>
+              <a:spcBef>
+                <a:spcPct val="0"/>
+              </a:spcBef>
+              <a:spcAft>
+                <a:spcPct val="0"/>
+              </a:spcAft>
+              <a:buClrTx/>
+              <a:buSzTx/>
+              <a:buFontTx/>
+              <a:buNone/>
+              <a:tabLst/>
+            </a:pPr>
+            <a:r>
+              <a:rPr kumimoji="0" lang="en-US" altLang="en-US" sz="2400" b="0" i="0" u="none" strike="noStrike" cap="none" normalizeH="0" baseline="0" dirty="0">
+                <a:ln>
+                  <a:noFill/>
+                </a:ln>
+                <a:solidFill>
+                  <a:schemeClr val="tx1"/>
+                </a:solidFill>
+                <a:effectLst/>
+                <a:latin typeface="+mn-lt"/>
+                <a:ea typeface="Calibri" panose="020F0502020204030204" pitchFamily="34" charset="0"/>
+                <a:cs typeface="Arial" panose="020B0604020202020204" pitchFamily="34" charset="0"/>
+              </a:rPr>
+              <a:t>The total conditional coverage was </a:t>
+            </a:r>
+            <a:r>
+              <a:rPr kumimoji="0" lang="he-IL" altLang="en-US" sz="2400" b="0" i="0" u="none" strike="noStrike" cap="none" normalizeH="0" baseline="0" dirty="0">
+                <a:ln>
+                  <a:noFill/>
+                </a:ln>
+                <a:solidFill>
+                  <a:schemeClr val="tx1"/>
+                </a:solidFill>
+                <a:effectLst/>
+                <a:latin typeface="+mn-lt"/>
+                <a:ea typeface="Calibri" panose="020F0502020204030204" pitchFamily="34" charset="0"/>
+                <a:cs typeface="Arial" panose="020B0604020202020204" pitchFamily="34" charset="0"/>
+              </a:rPr>
+              <a:t>98</a:t>
+            </a:r>
+            <a:r>
+              <a:rPr kumimoji="0" lang="en-US" altLang="en-US" sz="2400" b="0" i="0" u="none" strike="noStrike" cap="none" normalizeH="0" baseline="0" dirty="0">
+                <a:ln>
+                  <a:noFill/>
+                </a:ln>
+                <a:solidFill>
+                  <a:schemeClr val="tx1"/>
+                </a:solidFill>
+                <a:effectLst/>
+                <a:latin typeface="+mn-lt"/>
+                <a:ea typeface="Calibri" panose="020F0502020204030204" pitchFamily="34" charset="0"/>
+                <a:cs typeface="Arial" panose="020B0604020202020204" pitchFamily="34" charset="0"/>
+              </a:rPr>
+              <a:t>.</a:t>
+            </a:r>
+            <a:r>
+              <a:rPr kumimoji="0" lang="he-IL" altLang="en-US" sz="2400" b="0" i="0" u="none" strike="noStrike" cap="none" normalizeH="0" baseline="0" dirty="0">
+                <a:ln>
+                  <a:noFill/>
+                </a:ln>
+                <a:solidFill>
+                  <a:schemeClr val="tx1"/>
+                </a:solidFill>
+                <a:effectLst/>
+                <a:latin typeface="+mn-lt"/>
+                <a:ea typeface="Calibri" panose="020F0502020204030204" pitchFamily="34" charset="0"/>
+                <a:cs typeface="Arial" panose="020B0604020202020204" pitchFamily="34" charset="0"/>
+              </a:rPr>
+              <a:t>26</a:t>
+            </a:r>
+            <a:r>
+              <a:rPr kumimoji="0" lang="en-US" altLang="en-US" sz="2400" b="0" i="0" u="none" strike="noStrike" cap="none" normalizeH="0" baseline="0" dirty="0">
+                <a:ln>
+                  <a:noFill/>
+                </a:ln>
+                <a:solidFill>
+                  <a:schemeClr val="tx1"/>
+                </a:solidFill>
+                <a:effectLst/>
+                <a:latin typeface="+mn-lt"/>
+                <a:ea typeface="Calibri" panose="020F0502020204030204" pitchFamily="34" charset="0"/>
+                <a:cs typeface="Arial" panose="020B0604020202020204" pitchFamily="34" charset="0"/>
+              </a:rPr>
+              <a:t>%. </a:t>
+            </a:r>
+          </a:p>
+          <a:p>
+            <a:pPr marL="0" marR="0" lvl="0" indent="0" algn="l" defTabSz="914400" rtl="0" eaLnBrk="0" fontAlgn="base" latinLnBrk="0" hangingPunct="0">
+              <a:lnSpc>
+                <a:spcPct val="100000"/>
+              </a:lnSpc>
+              <a:spcBef>
+                <a:spcPct val="0"/>
+              </a:spcBef>
+              <a:spcAft>
+                <a:spcPct val="0"/>
+              </a:spcAft>
+              <a:buClrTx/>
+              <a:buSzTx/>
+              <a:buFontTx/>
+              <a:buNone/>
+              <a:tabLst/>
+            </a:pPr>
+            <a:r>
+              <a:rPr lang="en-US" altLang="en-US" sz="2400" dirty="0">
+                <a:latin typeface="+mn-lt"/>
+                <a:ea typeface="Calibri" panose="020F0502020204030204" pitchFamily="34" charset="0"/>
+                <a:cs typeface="Arial" panose="020B0604020202020204" pitchFamily="34" charset="0"/>
+              </a:rPr>
+              <a:t>U</a:t>
+            </a:r>
+            <a:r>
+              <a:rPr kumimoji="0" lang="en-US" altLang="en-US" sz="2400" b="0" i="0" u="none" strike="noStrike" cap="none" normalizeH="0" baseline="0" dirty="0">
+                <a:ln>
+                  <a:noFill/>
+                </a:ln>
+                <a:solidFill>
+                  <a:schemeClr val="tx1"/>
+                </a:solidFill>
+                <a:effectLst/>
+                <a:latin typeface="+mn-lt"/>
+                <a:ea typeface="Calibri" panose="020F0502020204030204" pitchFamily="34" charset="0"/>
+                <a:cs typeface="Arial" panose="020B0604020202020204" pitchFamily="34" charset="0"/>
+              </a:rPr>
+              <a:t>ncovered conditionals come from the following modules:</a:t>
+            </a:r>
+            <a:endParaRPr kumimoji="0" lang="en-US" altLang="en-US" sz="2400" b="0" i="0" u="none" strike="noStrike" cap="none" normalizeH="0" baseline="0" dirty="0">
+              <a:ln>
+                <a:noFill/>
+              </a:ln>
+              <a:solidFill>
+                <a:schemeClr val="tx1"/>
+              </a:solidFill>
+              <a:effectLst/>
+              <a:latin typeface="+mn-lt"/>
+            </a:endParaRPr>
+          </a:p>
+          <a:p>
+            <a:pPr marL="0" marR="0" lvl="0" indent="0" algn="l" defTabSz="914400" rtl="0" eaLnBrk="0" fontAlgn="base" latinLnBrk="0" hangingPunct="0">
+              <a:lnSpc>
+                <a:spcPct val="100000"/>
+              </a:lnSpc>
+              <a:spcBef>
+                <a:spcPct val="0"/>
+              </a:spcBef>
+              <a:spcAft>
+                <a:spcPct val="0"/>
+              </a:spcAft>
+              <a:buClrTx/>
+              <a:buSzTx/>
+              <a:buFontTx/>
+              <a:buChar char="•"/>
+              <a:tabLst/>
+            </a:pPr>
+            <a:r>
+              <a:rPr kumimoji="0" lang="en-US" altLang="en-US" sz="2400" b="0" i="0" u="none" strike="noStrike" cap="none" normalizeH="0" baseline="0" dirty="0">
+                <a:ln>
+                  <a:noFill/>
+                </a:ln>
+                <a:solidFill>
+                  <a:schemeClr val="tx1"/>
+                </a:solidFill>
+                <a:effectLst/>
+                <a:latin typeface="+mn-lt"/>
+                <a:ea typeface="Calibri" panose="020F0502020204030204" pitchFamily="34" charset="0"/>
+                <a:cs typeface="Arial" panose="020B0604020202020204" pitchFamily="34" charset="0"/>
+              </a:rPr>
+              <a:t>Reg File</a:t>
+            </a:r>
+            <a:endParaRPr kumimoji="0" lang="en-US" altLang="en-US" sz="2400" b="0" i="0" u="none" strike="noStrike" cap="none" normalizeH="0" baseline="0" dirty="0">
+              <a:ln>
+                <a:noFill/>
+              </a:ln>
+              <a:solidFill>
+                <a:schemeClr val="tx1"/>
+              </a:solidFill>
+              <a:effectLst/>
+              <a:latin typeface="+mn-lt"/>
+            </a:endParaRPr>
+          </a:p>
+          <a:p>
+            <a:pPr marL="0" marR="0" lvl="0" indent="0" algn="l" defTabSz="914400" rtl="0" eaLnBrk="0" fontAlgn="base" latinLnBrk="0" hangingPunct="0">
+              <a:lnSpc>
+                <a:spcPct val="100000"/>
+              </a:lnSpc>
+              <a:spcBef>
+                <a:spcPct val="0"/>
+              </a:spcBef>
+              <a:spcAft>
+                <a:spcPct val="0"/>
+              </a:spcAft>
+              <a:buClrTx/>
+              <a:buSzTx/>
+              <a:buFontTx/>
+              <a:buChar char="•"/>
+              <a:tabLst/>
+            </a:pPr>
+            <a:r>
+              <a:rPr kumimoji="0" lang="en-US" altLang="en-US" sz="2400" b="0" i="0" u="none" strike="noStrike" cap="none" normalizeH="0" baseline="0" dirty="0">
+                <a:ln>
+                  <a:noFill/>
+                </a:ln>
+                <a:solidFill>
+                  <a:schemeClr val="tx1"/>
+                </a:solidFill>
+                <a:effectLst/>
+                <a:latin typeface="+mn-lt"/>
+                <a:ea typeface="Calibri" panose="020F0502020204030204" pitchFamily="34" charset="0"/>
+                <a:cs typeface="Arial" panose="020B0604020202020204" pitchFamily="34" charset="0"/>
+              </a:rPr>
+              <a:t>RAM</a:t>
+            </a:r>
+            <a:endParaRPr kumimoji="0" lang="en-US" altLang="en-US" sz="2400" b="0" i="0" u="none" strike="noStrike" cap="none" normalizeH="0" baseline="0" dirty="0">
+              <a:ln>
+                <a:noFill/>
+              </a:ln>
+              <a:solidFill>
+                <a:schemeClr val="tx1"/>
+              </a:solidFill>
+              <a:effectLst/>
+              <a:latin typeface="+mn-lt"/>
+            </a:endParaRPr>
+          </a:p>
+          <a:p>
+            <a:pPr marL="0" marR="0" lvl="0" indent="0" algn="l" defTabSz="914400" rtl="0" eaLnBrk="0" fontAlgn="base" latinLnBrk="0" hangingPunct="0">
+              <a:lnSpc>
+                <a:spcPct val="100000"/>
+              </a:lnSpc>
+              <a:spcBef>
+                <a:spcPct val="0"/>
+              </a:spcBef>
+              <a:spcAft>
+                <a:spcPct val="0"/>
+              </a:spcAft>
+              <a:buClrTx/>
+              <a:buSzTx/>
+              <a:buFontTx/>
+              <a:buChar char="•"/>
+              <a:tabLst/>
+            </a:pPr>
+            <a:r>
+              <a:rPr kumimoji="0" lang="en-US" altLang="en-US" sz="2400" b="0" i="0" u="none" strike="noStrike" cap="none" normalizeH="0" baseline="0" dirty="0">
+                <a:ln>
+                  <a:noFill/>
+                </a:ln>
+                <a:solidFill>
+                  <a:schemeClr val="tx1"/>
+                </a:solidFill>
+                <a:effectLst/>
+                <a:latin typeface="+mn-lt"/>
+                <a:ea typeface="Calibri" panose="020F0502020204030204" pitchFamily="34" charset="0"/>
+                <a:cs typeface="Arial" panose="020B0604020202020204" pitchFamily="34" charset="0"/>
+              </a:rPr>
+              <a:t>Classification block</a:t>
+            </a:r>
+            <a:endParaRPr kumimoji="0" lang="en-US" altLang="en-US" sz="2400" b="0" i="0" u="none" strike="noStrike" cap="none" normalizeH="0" baseline="0" dirty="0">
+              <a:ln>
+                <a:noFill/>
+              </a:ln>
+              <a:solidFill>
+                <a:schemeClr val="tx1"/>
+              </a:solidFill>
+              <a:effectLst/>
+              <a:latin typeface="+mn-lt"/>
+            </a:endParaRPr>
+          </a:p>
+          <a:p>
+            <a:pPr marL="0" marR="0" lvl="0" indent="0" algn="l" defTabSz="914400" rtl="0" eaLnBrk="0" fontAlgn="base" latinLnBrk="0" hangingPunct="0">
+              <a:lnSpc>
+                <a:spcPct val="100000"/>
+              </a:lnSpc>
+              <a:spcBef>
+                <a:spcPct val="0"/>
+              </a:spcBef>
+              <a:spcAft>
+                <a:spcPct val="0"/>
+              </a:spcAft>
+              <a:buClrTx/>
+              <a:buSzTx/>
+              <a:buFontTx/>
+              <a:buChar char="•"/>
+              <a:tabLst/>
+            </a:pPr>
+            <a:r>
+              <a:rPr kumimoji="0" lang="en-US" altLang="en-US" sz="2400" b="0" i="0" u="none" strike="noStrike" cap="none" normalizeH="0" baseline="0" dirty="0">
+                <a:ln>
+                  <a:noFill/>
+                </a:ln>
+                <a:solidFill>
+                  <a:schemeClr val="tx1"/>
+                </a:solidFill>
+                <a:effectLst/>
+                <a:latin typeface="+mn-lt"/>
+                <a:ea typeface="Calibri" panose="020F0502020204030204" pitchFamily="34" charset="0"/>
+                <a:cs typeface="Arial" panose="020B0604020202020204" pitchFamily="34" charset="0"/>
+              </a:rPr>
+              <a:t>Convergence check block</a:t>
+            </a:r>
+            <a:endParaRPr kumimoji="0" lang="en-US" altLang="en-US" sz="2400" b="0" i="0" u="none" strike="noStrike" cap="none" normalizeH="0" baseline="0" dirty="0">
+              <a:ln>
+                <a:noFill/>
+              </a:ln>
+              <a:solidFill>
+                <a:schemeClr val="tx1"/>
+              </a:solidFill>
+              <a:effectLst/>
+              <a:latin typeface="+mn-lt"/>
+            </a:endParaRPr>
+          </a:p>
+          <a:p>
+            <a:pPr marL="0" marR="0" lvl="0" indent="0" algn="l" defTabSz="914400" rtl="0" eaLnBrk="0" fontAlgn="base" latinLnBrk="0" hangingPunct="0">
+              <a:lnSpc>
+                <a:spcPct val="100000"/>
+              </a:lnSpc>
+              <a:spcBef>
+                <a:spcPct val="0"/>
+              </a:spcBef>
+              <a:spcAft>
+                <a:spcPct val="0"/>
+              </a:spcAft>
+              <a:buClrTx/>
+              <a:buSzTx/>
+              <a:buFontTx/>
+              <a:buChar char="•"/>
+              <a:tabLst/>
+            </a:pPr>
+            <a:r>
+              <a:rPr kumimoji="0" lang="en-US" altLang="en-US" sz="2400" b="0" i="0" u="none" strike="noStrike" cap="none" normalizeH="0" baseline="0" dirty="0">
+                <a:ln>
+                  <a:noFill/>
+                </a:ln>
+                <a:solidFill>
+                  <a:schemeClr val="tx1"/>
+                </a:solidFill>
+                <a:effectLst/>
+                <a:latin typeface="+mn-lt"/>
+                <a:ea typeface="Calibri" panose="020F0502020204030204" pitchFamily="34" charset="0"/>
+                <a:cs typeface="Arial" panose="020B0604020202020204" pitchFamily="34" charset="0"/>
+              </a:rPr>
+              <a:t>New means calculation </a:t>
+            </a:r>
+            <a:r>
+              <a:rPr kumimoji="0" lang="en-US" altLang="en-US" sz="2400" b="0" i="0" u="none" strike="noStrike" cap="none" normalizeH="0" baseline="0" dirty="0" err="1">
+                <a:ln>
+                  <a:noFill/>
+                </a:ln>
+                <a:solidFill>
+                  <a:schemeClr val="tx1"/>
+                </a:solidFill>
+                <a:effectLst/>
+                <a:latin typeface="+mn-lt"/>
+                <a:ea typeface="Calibri" panose="020F0502020204030204" pitchFamily="34" charset="0"/>
+                <a:cs typeface="Arial" panose="020B0604020202020204" pitchFamily="34" charset="0"/>
+              </a:rPr>
+              <a:t>blockt</a:t>
+            </a:r>
+            <a:endParaRPr kumimoji="0" lang="en-US" altLang="en-US" sz="4000" b="0" i="0" u="none" strike="noStrike" cap="none" normalizeH="0" baseline="0" dirty="0">
+              <a:ln>
+                <a:noFill/>
+              </a:ln>
+              <a:solidFill>
+                <a:schemeClr val="tx1"/>
+              </a:solidFill>
+              <a:effectLst/>
+              <a:latin typeface="+mn-lt"/>
+            </a:endParaRPr>
+          </a:p>
+        </p:txBody>
+      </p:sp>
+    </p:spTree>
+    <p:extLst>
+      <p:ext uri="{BB962C8B-B14F-4D97-AF65-F5344CB8AC3E}">
+        <p14:creationId xmlns:p14="http://schemas.microsoft.com/office/powerpoint/2010/main" val="930090960"/>
+      </p:ext>
+    </p:extLst>
+  </p:cSld>
+  <p:clrMapOvr>
+    <a:masterClrMapping/>
+  </p:clrMapOvr>
+</p:sld>
+</file>
+
+<file path=ppt/slides/slide38.xml><?xml version="1.0" encoding="utf-8"?>
 <p:sld xmlns:a="http://schemas.openxmlformats.org/drawingml/2006/main" xmlns:r="http://schemas.openxmlformats.org/officeDocument/2006/relationships" xmlns:p="http://schemas.openxmlformats.org/presentationml/2006/main">
   <p:cSld>
     <p:spTree>
@@ -15236,277 +16146,6 @@
     <p:extLst>
       <p:ext uri="{BB962C8B-B14F-4D97-AF65-F5344CB8AC3E}">
         <p14:creationId xmlns:p14="http://schemas.microsoft.com/office/powerpoint/2010/main" val="3646463400"/>
-      </p:ext>
-    </p:extLst>
-  </p:cSld>
-  <p:clrMapOvr>
-    <a:masterClrMapping/>
-  </p:clrMapOvr>
-</p:sld>
-</file>
-
-<file path=ppt/slides/slide37.xml><?xml version="1.0" encoding="utf-8"?>
-<p:sld xmlns:a="http://schemas.openxmlformats.org/drawingml/2006/main" xmlns:r="http://schemas.openxmlformats.org/officeDocument/2006/relationships" xmlns:p="http://schemas.openxmlformats.org/presentationml/2006/main">
-  <p:cSld>
-    <p:spTree>
-      <p:nvGrpSpPr>
-        <p:cNvPr id="1" name=""/>
-        <p:cNvGrpSpPr/>
-        <p:nvPr/>
-      </p:nvGrpSpPr>
-      <p:grpSpPr>
-        <a:xfrm>
-          <a:off x="0" y="0"/>
-          <a:ext cx="0" cy="0"/>
-          <a:chOff x="0" y="0"/>
-          <a:chExt cx="0" cy="0"/>
-        </a:xfrm>
-      </p:grpSpPr>
-      <p:sp>
-        <p:nvSpPr>
-          <p:cNvPr id="2" name="Title 1">
-            <a:extLst>
-              <a:ext uri="{FF2B5EF4-FFF2-40B4-BE49-F238E27FC236}">
-                <a16:creationId xmlns:a16="http://schemas.microsoft.com/office/drawing/2014/main" id="{F725E260-500D-4FC8-AABF-B6FD8431A1A6}"/>
-              </a:ext>
-            </a:extLst>
-          </p:cNvPr>
-          <p:cNvSpPr>
-            <a:spLocks noGrp="1"/>
-          </p:cNvSpPr>
-          <p:nvPr>
-            <p:ph type="title"/>
-          </p:nvPr>
-        </p:nvSpPr>
-        <p:spPr/>
-        <p:txBody>
-          <a:bodyPr/>
-          <a:lstStyle/>
-          <a:p>
-            <a:r>
-              <a:rPr lang="en-US" dirty="0"/>
-              <a:t>Coverage results – Functional Coverage NUM_POINST</a:t>
-            </a:r>
-          </a:p>
-        </p:txBody>
-      </p:sp>
-      <p:sp>
-        <p:nvSpPr>
-          <p:cNvPr id="3" name="Content Placeholder 2">
-            <a:extLst>
-              <a:ext uri="{FF2B5EF4-FFF2-40B4-BE49-F238E27FC236}">
-                <a16:creationId xmlns:a16="http://schemas.microsoft.com/office/drawing/2014/main" id="{56F27B78-894F-4685-83BE-70226015780B}"/>
-              </a:ext>
-            </a:extLst>
-          </p:cNvPr>
-          <p:cNvSpPr>
-            <a:spLocks noGrp="1"/>
-          </p:cNvSpPr>
-          <p:nvPr>
-            <p:ph idx="1"/>
-          </p:nvPr>
-        </p:nvSpPr>
-        <p:spPr>
-          <a:xfrm>
-            <a:off x="838200" y="1825625"/>
-            <a:ext cx="2566182" cy="4351338"/>
-          </a:xfrm>
-        </p:spPr>
-        <p:txBody>
-          <a:bodyPr>
-            <a:normAutofit/>
-          </a:bodyPr>
-          <a:lstStyle/>
-          <a:p>
-            <a:r>
-              <a:rPr lang="en-US" sz="2400" dirty="0">
-                <a:effectLst/>
-                <a:latin typeface="Calibri" panose="020F0502020204030204" pitchFamily="34" charset="0"/>
-                <a:ea typeface="Calibri" panose="020F0502020204030204" pitchFamily="34" charset="0"/>
-                <a:cs typeface="Arial" panose="020B0604020202020204" pitchFamily="34" charset="0"/>
-              </a:rPr>
-              <a:t>As</a:t>
-            </a:r>
-            <a:r>
-              <a:rPr lang="en-US" sz="2400" dirty="0">
-                <a:solidFill>
-                  <a:srgbClr val="FF0000"/>
-                </a:solidFill>
-                <a:effectLst/>
-                <a:latin typeface="Calibri" panose="020F0502020204030204" pitchFamily="34" charset="0"/>
-                <a:ea typeface="Calibri" panose="020F0502020204030204" pitchFamily="34" charset="0"/>
-                <a:cs typeface="Arial" panose="020B0604020202020204" pitchFamily="34" charset="0"/>
-              </a:rPr>
-              <a:t> </a:t>
-            </a:r>
-            <a:r>
-              <a:rPr lang="en-US" sz="2400" dirty="0">
-                <a:effectLst/>
-                <a:latin typeface="Calibri" panose="020F0502020204030204" pitchFamily="34" charset="0"/>
-                <a:ea typeface="Calibri" panose="020F0502020204030204" pitchFamily="34" charset="0"/>
-                <a:cs typeface="Arial" panose="020B0604020202020204" pitchFamily="34" charset="0"/>
-              </a:rPr>
-              <a:t>can be seen form the figures attached, the number of points in all the tests was uniformly distributed between 8 and 512.</a:t>
-            </a:r>
-          </a:p>
-          <a:p>
-            <a:endParaRPr lang="en-US" sz="3600" dirty="0"/>
-          </a:p>
-        </p:txBody>
-      </p:sp>
-      <p:pic>
-        <p:nvPicPr>
-          <p:cNvPr id="4" name="Picture 3">
-            <a:extLst>
-              <a:ext uri="{FF2B5EF4-FFF2-40B4-BE49-F238E27FC236}">
-                <a16:creationId xmlns:a16="http://schemas.microsoft.com/office/drawing/2014/main" id="{9A52836D-2C3C-49EC-81A3-771BA3F59E9F}"/>
-              </a:ext>
-            </a:extLst>
-          </p:cNvPr>
-          <p:cNvPicPr/>
-          <p:nvPr/>
-        </p:nvPicPr>
-        <p:blipFill>
-          <a:blip r:embed="rId2"/>
-          <a:stretch>
-            <a:fillRect/>
-          </a:stretch>
-        </p:blipFill>
-        <p:spPr>
-          <a:xfrm>
-            <a:off x="3896751" y="2073934"/>
-            <a:ext cx="6630572" cy="3707888"/>
-          </a:xfrm>
-          <a:prstGeom prst="rect">
-            <a:avLst/>
-          </a:prstGeom>
-        </p:spPr>
-      </p:pic>
-    </p:spTree>
-    <p:extLst>
-      <p:ext uri="{BB962C8B-B14F-4D97-AF65-F5344CB8AC3E}">
-        <p14:creationId xmlns:p14="http://schemas.microsoft.com/office/powerpoint/2010/main" val="2110487780"/>
-      </p:ext>
-    </p:extLst>
-  </p:cSld>
-  <p:clrMapOvr>
-    <a:masterClrMapping/>
-  </p:clrMapOvr>
-</p:sld>
-</file>
-
-<file path=ppt/slides/slide38.xml><?xml version="1.0" encoding="utf-8"?>
-<p:sld xmlns:a="http://schemas.openxmlformats.org/drawingml/2006/main" xmlns:r="http://schemas.openxmlformats.org/officeDocument/2006/relationships" xmlns:p="http://schemas.openxmlformats.org/presentationml/2006/main">
-  <p:cSld>
-    <p:spTree>
-      <p:nvGrpSpPr>
-        <p:cNvPr id="1" name=""/>
-        <p:cNvGrpSpPr/>
-        <p:nvPr/>
-      </p:nvGrpSpPr>
-      <p:grpSpPr>
-        <a:xfrm>
-          <a:off x="0" y="0"/>
-          <a:ext cx="0" cy="0"/>
-          <a:chOff x="0" y="0"/>
-          <a:chExt cx="0" cy="0"/>
-        </a:xfrm>
-      </p:grpSpPr>
-      <p:sp>
-        <p:nvSpPr>
-          <p:cNvPr id="2" name="Title 1">
-            <a:extLst>
-              <a:ext uri="{FF2B5EF4-FFF2-40B4-BE49-F238E27FC236}">
-                <a16:creationId xmlns:a16="http://schemas.microsoft.com/office/drawing/2014/main" id="{F725E260-500D-4FC8-AABF-B6FD8431A1A6}"/>
-              </a:ext>
-            </a:extLst>
-          </p:cNvPr>
-          <p:cNvSpPr>
-            <a:spLocks noGrp="1"/>
-          </p:cNvSpPr>
-          <p:nvPr>
-            <p:ph type="title"/>
-          </p:nvPr>
-        </p:nvSpPr>
-        <p:spPr/>
-        <p:txBody>
-          <a:bodyPr/>
-          <a:lstStyle/>
-          <a:p>
-            <a:r>
-              <a:rPr lang="en-US" dirty="0"/>
-              <a:t>Coverage results – Functional Coverage DATA_VALUE</a:t>
-            </a:r>
-          </a:p>
-        </p:txBody>
-      </p:sp>
-      <p:sp>
-        <p:nvSpPr>
-          <p:cNvPr id="3" name="Content Placeholder 2">
-            <a:extLst>
-              <a:ext uri="{FF2B5EF4-FFF2-40B4-BE49-F238E27FC236}">
-                <a16:creationId xmlns:a16="http://schemas.microsoft.com/office/drawing/2014/main" id="{56F27B78-894F-4685-83BE-70226015780B}"/>
-              </a:ext>
-            </a:extLst>
-          </p:cNvPr>
-          <p:cNvSpPr>
-            <a:spLocks noGrp="1"/>
-          </p:cNvSpPr>
-          <p:nvPr>
-            <p:ph idx="1"/>
-          </p:nvPr>
-        </p:nvSpPr>
-        <p:spPr>
-          <a:xfrm>
-            <a:off x="838200" y="1825625"/>
-            <a:ext cx="2566182" cy="4351338"/>
-          </a:xfrm>
-        </p:spPr>
-        <p:txBody>
-          <a:bodyPr>
-            <a:normAutofit fontScale="77500" lnSpcReduction="20000"/>
-          </a:bodyPr>
-          <a:lstStyle/>
-          <a:p>
-            <a:r>
-              <a:rPr lang="en-US" sz="3600" dirty="0"/>
-              <a:t>As can be seen form the figures attached, for all data points, the values of their coordinates were normally distributed between all the possible values in all the tests.</a:t>
-            </a:r>
-          </a:p>
-        </p:txBody>
-      </p:sp>
-      <p:pic>
-        <p:nvPicPr>
-          <p:cNvPr id="5" name="Picture 4">
-            <a:extLst>
-              <a:ext uri="{FF2B5EF4-FFF2-40B4-BE49-F238E27FC236}">
-                <a16:creationId xmlns:a16="http://schemas.microsoft.com/office/drawing/2014/main" id="{626FEBA1-B578-482A-A266-65A3AA360BC7}"/>
-              </a:ext>
-            </a:extLst>
-          </p:cNvPr>
-          <p:cNvPicPr/>
-          <p:nvPr/>
-        </p:nvPicPr>
-        <p:blipFill>
-          <a:blip r:embed="rId2"/>
-          <a:stretch>
-            <a:fillRect/>
-          </a:stretch>
-        </p:blipFill>
-        <p:spPr>
-          <a:xfrm>
-            <a:off x="4149969" y="2044700"/>
-            <a:ext cx="6588369" cy="4351338"/>
-          </a:xfrm>
-          <a:prstGeom prst="rect">
-            <a:avLst/>
-          </a:prstGeom>
-        </p:spPr>
-      </p:pic>
-    </p:spTree>
-    <p:extLst>
-      <p:ext uri="{BB962C8B-B14F-4D97-AF65-F5344CB8AC3E}">
-        <p14:creationId xmlns:p14="http://schemas.microsoft.com/office/powerpoint/2010/main" val="2364078193"/>
       </p:ext>
     </p:extLst>
   </p:cSld>
@@ -15556,7 +16195,7 @@
           <a:p>
             <a:r>
               <a:rPr lang="en-US" dirty="0"/>
-              <a:t>Coverage results – Functional Coverage CENT_VALUE</a:t>
+              <a:t>Coverage results – Functional Coverage NUM_POINST</a:t>
             </a:r>
           </a:p>
         </p:txBody>
@@ -15585,23 +16224,52 @@
         </p:spPr>
         <p:txBody>
           <a:bodyPr>
-            <a:normAutofit fontScale="70000" lnSpcReduction="20000"/>
+            <a:normAutofit/>
           </a:bodyPr>
           <a:lstStyle/>
           <a:p>
             <a:r>
-              <a:rPr lang="en-US" sz="3600" dirty="0"/>
-              <a:t>As can be seen form the figure attached, for centroid 1 the values of its coordinates were normally distributed between all the possible values in all the tests. This also is correct for the other 7 centroids.</a:t>
-            </a:r>
+              <a:rPr lang="en-US" sz="2400" dirty="0">
+                <a:effectLst/>
+                <a:latin typeface="Calibri" panose="020F0502020204030204" pitchFamily="34" charset="0"/>
+                <a:ea typeface="Calibri" panose="020F0502020204030204" pitchFamily="34" charset="0"/>
+                <a:cs typeface="Arial" panose="020B0604020202020204" pitchFamily="34" charset="0"/>
+              </a:rPr>
+              <a:t>As</a:t>
+            </a:r>
+            <a:r>
+              <a:rPr lang="en-US" sz="2400" dirty="0">
+                <a:solidFill>
+                  <a:srgbClr val="FF0000"/>
+                </a:solidFill>
+                <a:effectLst/>
+                <a:latin typeface="Calibri" panose="020F0502020204030204" pitchFamily="34" charset="0"/>
+                <a:ea typeface="Calibri" panose="020F0502020204030204" pitchFamily="34" charset="0"/>
+                <a:cs typeface="Arial" panose="020B0604020202020204" pitchFamily="34" charset="0"/>
+              </a:rPr>
+              <a:t> </a:t>
+            </a:r>
+            <a:r>
+              <a:rPr lang="en-US" sz="2400" dirty="0">
+                <a:effectLst/>
+                <a:latin typeface="Calibri" panose="020F0502020204030204" pitchFamily="34" charset="0"/>
+                <a:ea typeface="Calibri" panose="020F0502020204030204" pitchFamily="34" charset="0"/>
+                <a:cs typeface="Arial" panose="020B0604020202020204" pitchFamily="34" charset="0"/>
+              </a:rPr>
+              <a:t>can be seen form the figures attached, the number of points in all the tests was uniformly distributed between 8 and 512.</a:t>
+            </a:r>
+          </a:p>
+          <a:p>
+            <a:endParaRPr lang="en-US" sz="3600" dirty="0"/>
           </a:p>
         </p:txBody>
       </p:sp>
       <p:pic>
         <p:nvPicPr>
-          <p:cNvPr id="6" name="Picture 5">
+          <p:cNvPr id="4" name="Picture 3">
             <a:extLst>
               <a:ext uri="{FF2B5EF4-FFF2-40B4-BE49-F238E27FC236}">
-                <a16:creationId xmlns:a16="http://schemas.microsoft.com/office/drawing/2014/main" id="{20BE9623-66D8-4C26-97A9-041804F9CCD2}"/>
+                <a16:creationId xmlns:a16="http://schemas.microsoft.com/office/drawing/2014/main" id="{9A52836D-2C3C-49EC-81A3-771BA3F59E9F}"/>
               </a:ext>
             </a:extLst>
           </p:cNvPr>
@@ -15616,8 +16284,8 @@
         </p:blipFill>
         <p:spPr>
           <a:xfrm>
-            <a:off x="4164037" y="1690687"/>
-            <a:ext cx="7189763" cy="4802187"/>
+            <a:off x="3896751" y="2073934"/>
+            <a:ext cx="6630572" cy="3707888"/>
           </a:xfrm>
           <a:prstGeom prst="rect">
             <a:avLst/>
@@ -15627,7 +16295,7 @@
     </p:spTree>
     <p:extLst>
       <p:ext uri="{BB962C8B-B14F-4D97-AF65-F5344CB8AC3E}">
-        <p14:creationId xmlns:p14="http://schemas.microsoft.com/office/powerpoint/2010/main" val="856294077"/>
+        <p14:creationId xmlns:p14="http://schemas.microsoft.com/office/powerpoint/2010/main" val="2110487780"/>
       </p:ext>
     </p:extLst>
   </p:cSld>
@@ -15826,6 +16494,248 @@
 </file>
 
 <file path=ppt/slides/slide40.xml><?xml version="1.0" encoding="utf-8"?>
+<p:sld xmlns:a="http://schemas.openxmlformats.org/drawingml/2006/main" xmlns:r="http://schemas.openxmlformats.org/officeDocument/2006/relationships" xmlns:p="http://schemas.openxmlformats.org/presentationml/2006/main">
+  <p:cSld>
+    <p:spTree>
+      <p:nvGrpSpPr>
+        <p:cNvPr id="1" name=""/>
+        <p:cNvGrpSpPr/>
+        <p:nvPr/>
+      </p:nvGrpSpPr>
+      <p:grpSpPr>
+        <a:xfrm>
+          <a:off x="0" y="0"/>
+          <a:ext cx="0" cy="0"/>
+          <a:chOff x="0" y="0"/>
+          <a:chExt cx="0" cy="0"/>
+        </a:xfrm>
+      </p:grpSpPr>
+      <p:sp>
+        <p:nvSpPr>
+          <p:cNvPr id="2" name="Title 1">
+            <a:extLst>
+              <a:ext uri="{FF2B5EF4-FFF2-40B4-BE49-F238E27FC236}">
+                <a16:creationId xmlns:a16="http://schemas.microsoft.com/office/drawing/2014/main" id="{F725E260-500D-4FC8-AABF-B6FD8431A1A6}"/>
+              </a:ext>
+            </a:extLst>
+          </p:cNvPr>
+          <p:cNvSpPr>
+            <a:spLocks noGrp="1"/>
+          </p:cNvSpPr>
+          <p:nvPr>
+            <p:ph type="title"/>
+          </p:nvPr>
+        </p:nvSpPr>
+        <p:spPr/>
+        <p:txBody>
+          <a:bodyPr/>
+          <a:lstStyle/>
+          <a:p>
+            <a:r>
+              <a:rPr lang="en-US" dirty="0"/>
+              <a:t>Coverage results – Functional Coverage DATA_VALUE</a:t>
+            </a:r>
+          </a:p>
+        </p:txBody>
+      </p:sp>
+      <p:sp>
+        <p:nvSpPr>
+          <p:cNvPr id="3" name="Content Placeholder 2">
+            <a:extLst>
+              <a:ext uri="{FF2B5EF4-FFF2-40B4-BE49-F238E27FC236}">
+                <a16:creationId xmlns:a16="http://schemas.microsoft.com/office/drawing/2014/main" id="{56F27B78-894F-4685-83BE-70226015780B}"/>
+              </a:ext>
+            </a:extLst>
+          </p:cNvPr>
+          <p:cNvSpPr>
+            <a:spLocks noGrp="1"/>
+          </p:cNvSpPr>
+          <p:nvPr>
+            <p:ph idx="1"/>
+          </p:nvPr>
+        </p:nvSpPr>
+        <p:spPr>
+          <a:xfrm>
+            <a:off x="838200" y="1825625"/>
+            <a:ext cx="2566182" cy="4351338"/>
+          </a:xfrm>
+        </p:spPr>
+        <p:txBody>
+          <a:bodyPr>
+            <a:normAutofit fontScale="77500" lnSpcReduction="20000"/>
+          </a:bodyPr>
+          <a:lstStyle/>
+          <a:p>
+            <a:r>
+              <a:rPr lang="en-US" sz="3600" dirty="0"/>
+              <a:t>As can be seen form the figures attached, for all data points, the values of their coordinates were normally distributed between all the possible values in all the tests.</a:t>
+            </a:r>
+          </a:p>
+        </p:txBody>
+      </p:sp>
+      <p:pic>
+        <p:nvPicPr>
+          <p:cNvPr id="5" name="Picture 4">
+            <a:extLst>
+              <a:ext uri="{FF2B5EF4-FFF2-40B4-BE49-F238E27FC236}">
+                <a16:creationId xmlns:a16="http://schemas.microsoft.com/office/drawing/2014/main" id="{626FEBA1-B578-482A-A266-65A3AA360BC7}"/>
+              </a:ext>
+            </a:extLst>
+          </p:cNvPr>
+          <p:cNvPicPr/>
+          <p:nvPr/>
+        </p:nvPicPr>
+        <p:blipFill>
+          <a:blip r:embed="rId2"/>
+          <a:stretch>
+            <a:fillRect/>
+          </a:stretch>
+        </p:blipFill>
+        <p:spPr>
+          <a:xfrm>
+            <a:off x="4149969" y="2044700"/>
+            <a:ext cx="6588369" cy="4351338"/>
+          </a:xfrm>
+          <a:prstGeom prst="rect">
+            <a:avLst/>
+          </a:prstGeom>
+        </p:spPr>
+      </p:pic>
+    </p:spTree>
+    <p:extLst>
+      <p:ext uri="{BB962C8B-B14F-4D97-AF65-F5344CB8AC3E}">
+        <p14:creationId xmlns:p14="http://schemas.microsoft.com/office/powerpoint/2010/main" val="2364078193"/>
+      </p:ext>
+    </p:extLst>
+  </p:cSld>
+  <p:clrMapOvr>
+    <a:masterClrMapping/>
+  </p:clrMapOvr>
+</p:sld>
+</file>
+
+<file path=ppt/slides/slide41.xml><?xml version="1.0" encoding="utf-8"?>
+<p:sld xmlns:a="http://schemas.openxmlformats.org/drawingml/2006/main" xmlns:r="http://schemas.openxmlformats.org/officeDocument/2006/relationships" xmlns:p="http://schemas.openxmlformats.org/presentationml/2006/main">
+  <p:cSld>
+    <p:spTree>
+      <p:nvGrpSpPr>
+        <p:cNvPr id="1" name=""/>
+        <p:cNvGrpSpPr/>
+        <p:nvPr/>
+      </p:nvGrpSpPr>
+      <p:grpSpPr>
+        <a:xfrm>
+          <a:off x="0" y="0"/>
+          <a:ext cx="0" cy="0"/>
+          <a:chOff x="0" y="0"/>
+          <a:chExt cx="0" cy="0"/>
+        </a:xfrm>
+      </p:grpSpPr>
+      <p:sp>
+        <p:nvSpPr>
+          <p:cNvPr id="2" name="Title 1">
+            <a:extLst>
+              <a:ext uri="{FF2B5EF4-FFF2-40B4-BE49-F238E27FC236}">
+                <a16:creationId xmlns:a16="http://schemas.microsoft.com/office/drawing/2014/main" id="{F725E260-500D-4FC8-AABF-B6FD8431A1A6}"/>
+              </a:ext>
+            </a:extLst>
+          </p:cNvPr>
+          <p:cNvSpPr>
+            <a:spLocks noGrp="1"/>
+          </p:cNvSpPr>
+          <p:nvPr>
+            <p:ph type="title"/>
+          </p:nvPr>
+        </p:nvSpPr>
+        <p:spPr/>
+        <p:txBody>
+          <a:bodyPr/>
+          <a:lstStyle/>
+          <a:p>
+            <a:r>
+              <a:rPr lang="en-US" dirty="0"/>
+              <a:t>Coverage results – Functional Coverage CENT_VALUE</a:t>
+            </a:r>
+          </a:p>
+        </p:txBody>
+      </p:sp>
+      <p:sp>
+        <p:nvSpPr>
+          <p:cNvPr id="3" name="Content Placeholder 2">
+            <a:extLst>
+              <a:ext uri="{FF2B5EF4-FFF2-40B4-BE49-F238E27FC236}">
+                <a16:creationId xmlns:a16="http://schemas.microsoft.com/office/drawing/2014/main" id="{56F27B78-894F-4685-83BE-70226015780B}"/>
+              </a:ext>
+            </a:extLst>
+          </p:cNvPr>
+          <p:cNvSpPr>
+            <a:spLocks noGrp="1"/>
+          </p:cNvSpPr>
+          <p:nvPr>
+            <p:ph idx="1"/>
+          </p:nvPr>
+        </p:nvSpPr>
+        <p:spPr>
+          <a:xfrm>
+            <a:off x="838200" y="1825625"/>
+            <a:ext cx="2566182" cy="4351338"/>
+          </a:xfrm>
+        </p:spPr>
+        <p:txBody>
+          <a:bodyPr>
+            <a:normAutofit fontScale="70000" lnSpcReduction="20000"/>
+          </a:bodyPr>
+          <a:lstStyle/>
+          <a:p>
+            <a:r>
+              <a:rPr lang="en-US" sz="3600" dirty="0"/>
+              <a:t>As can be seen form the figure attached, for centroid 1 the values of its coordinates were normally distributed between all the possible values in all the tests. This also is correct for the other 7 centroids.</a:t>
+            </a:r>
+          </a:p>
+        </p:txBody>
+      </p:sp>
+      <p:pic>
+        <p:nvPicPr>
+          <p:cNvPr id="6" name="Picture 5">
+            <a:extLst>
+              <a:ext uri="{FF2B5EF4-FFF2-40B4-BE49-F238E27FC236}">
+                <a16:creationId xmlns:a16="http://schemas.microsoft.com/office/drawing/2014/main" id="{20BE9623-66D8-4C26-97A9-041804F9CCD2}"/>
+              </a:ext>
+            </a:extLst>
+          </p:cNvPr>
+          <p:cNvPicPr/>
+          <p:nvPr/>
+        </p:nvPicPr>
+        <p:blipFill>
+          <a:blip r:embed="rId2"/>
+          <a:stretch>
+            <a:fillRect/>
+          </a:stretch>
+        </p:blipFill>
+        <p:spPr>
+          <a:xfrm>
+            <a:off x="4164037" y="1690687"/>
+            <a:ext cx="7189763" cy="4802187"/>
+          </a:xfrm>
+          <a:prstGeom prst="rect">
+            <a:avLst/>
+          </a:prstGeom>
+        </p:spPr>
+      </p:pic>
+    </p:spTree>
+    <p:extLst>
+      <p:ext uri="{BB962C8B-B14F-4D97-AF65-F5344CB8AC3E}">
+        <p14:creationId xmlns:p14="http://schemas.microsoft.com/office/powerpoint/2010/main" val="856294077"/>
+      </p:ext>
+    </p:extLst>
+  </p:cSld>
+  <p:clrMapOvr>
+    <a:masterClrMapping/>
+  </p:clrMapOvr>
+</p:sld>
+</file>
+
+<file path=ppt/slides/slide42.xml><?xml version="1.0" encoding="utf-8"?>
 <p:sld xmlns:a="http://schemas.openxmlformats.org/drawingml/2006/main" xmlns:r="http://schemas.openxmlformats.org/officeDocument/2006/relationships" xmlns:p="http://schemas.openxmlformats.org/presentationml/2006/main">
   <p:cSld>
     <p:spTree>
@@ -16040,7 +16950,7 @@
 </p:sld>
 </file>
 
-<file path=ppt/slides/slide41.xml><?xml version="1.0" encoding="utf-8"?>
+<file path=ppt/slides/slide43.xml><?xml version="1.0" encoding="utf-8"?>
 <p:sld xmlns:a="http://schemas.openxmlformats.org/drawingml/2006/main" xmlns:r="http://schemas.openxmlformats.org/officeDocument/2006/relationships" xmlns:p="http://schemas.openxmlformats.org/presentationml/2006/main">
   <p:cSld>
     <p:spTree>
@@ -17124,7 +18034,7 @@
 </p:sld>
 </file>
 
-<file path=ppt/slides/slide42.xml><?xml version="1.0" encoding="utf-8"?>
+<file path=ppt/slides/slide44.xml><?xml version="1.0" encoding="utf-8"?>
 <p:sld xmlns:a="http://schemas.openxmlformats.org/drawingml/2006/main" xmlns:r="http://schemas.openxmlformats.org/officeDocument/2006/relationships" xmlns:p="http://schemas.openxmlformats.org/presentationml/2006/main">
   <p:cSld>
     <p:spTree>
@@ -17303,7 +18213,7 @@
 </p:sld>
 </file>
 
-<file path=ppt/slides/slide43.xml><?xml version="1.0" encoding="utf-8"?>
+<file path=ppt/slides/slide45.xml><?xml version="1.0" encoding="utf-8"?>
 <p:sld xmlns:a="http://schemas.openxmlformats.org/drawingml/2006/main" xmlns:r="http://schemas.openxmlformats.org/officeDocument/2006/relationships" xmlns:p="http://schemas.openxmlformats.org/presentationml/2006/main">
   <p:cSld>
     <p:spTree>
@@ -17534,7 +18444,7 @@
 </p:sld>
 </file>
 
-<file path=ppt/slides/slide44.xml><?xml version="1.0" encoding="utf-8"?>
+<file path=ppt/slides/slide46.xml><?xml version="1.0" encoding="utf-8"?>
 <p:sld xmlns:a="http://schemas.openxmlformats.org/drawingml/2006/main" xmlns:r="http://schemas.openxmlformats.org/officeDocument/2006/relationships" xmlns:p="http://schemas.openxmlformats.org/presentationml/2006/main">
   <p:cSld>
     <p:spTree>

</xml_diff>